<commit_message>
Modified week1 slides to include intro/expectations
</commit_message>
<xml_diff>
--- a/slides/week1.pptx
+++ b/slides/week1.pptx
@@ -5,25 +5,27 @@
     <p:sldMasterId id="2147483684" r:id="rId4"/>
   </p:sldMasterIdLst>
   <p:notesMasterIdLst>
-    <p:notesMasterId r:id="rId18"/>
+    <p:notesMasterId r:id="rId20"/>
   </p:notesMasterIdLst>
   <p:handoutMasterIdLst>
-    <p:handoutMasterId r:id="rId19"/>
+    <p:handoutMasterId r:id="rId21"/>
   </p:handoutMasterIdLst>
   <p:sldIdLst>
     <p:sldId id="256" r:id="rId5"/>
-    <p:sldId id="260" r:id="rId6"/>
-    <p:sldId id="261" r:id="rId7"/>
-    <p:sldId id="268" r:id="rId8"/>
-    <p:sldId id="262" r:id="rId9"/>
-    <p:sldId id="269" r:id="rId10"/>
-    <p:sldId id="270" r:id="rId11"/>
-    <p:sldId id="271" r:id="rId12"/>
-    <p:sldId id="272" r:id="rId13"/>
-    <p:sldId id="273" r:id="rId14"/>
-    <p:sldId id="267" r:id="rId15"/>
-    <p:sldId id="274" r:id="rId16"/>
-    <p:sldId id="275" r:id="rId17"/>
+    <p:sldId id="276" r:id="rId6"/>
+    <p:sldId id="277" r:id="rId7"/>
+    <p:sldId id="260" r:id="rId8"/>
+    <p:sldId id="261" r:id="rId9"/>
+    <p:sldId id="268" r:id="rId10"/>
+    <p:sldId id="262" r:id="rId11"/>
+    <p:sldId id="269" r:id="rId12"/>
+    <p:sldId id="270" r:id="rId13"/>
+    <p:sldId id="271" r:id="rId14"/>
+    <p:sldId id="272" r:id="rId15"/>
+    <p:sldId id="273" r:id="rId16"/>
+    <p:sldId id="267" r:id="rId17"/>
+    <p:sldId id="274" r:id="rId18"/>
+    <p:sldId id="275" r:id="rId19"/>
   </p:sldIdLst>
   <p:sldSz cx="12192000" cy="6858000"/>
   <p:notesSz cx="6858000" cy="9144000"/>
@@ -227,7 +229,7 @@
           <a:p>
             <a:fld id="{2F51DC69-60C3-4CF7-A135-6E702ECCE0F0}" type="datetimeFigureOut">
               <a:rPr lang="en-US" smtClean="0"/>
-              <a:t>9/14/2019</a:t>
+              <a:t>9/15/2019</a:t>
             </a:fld>
             <a:endParaRPr lang="en-US" dirty="0"/>
           </a:p>
@@ -404,7 +406,7 @@
           <a:p>
             <a:fld id="{36E3EC7B-6C72-4FBB-87DF-2BD2CB7DC1E6}" type="datetimeFigureOut">
               <a:rPr lang="en-US" smtClean="0"/>
-              <a:t>9/14/2019</a:t>
+              <a:t>9/15/2019</a:t>
             </a:fld>
             <a:endParaRPr lang="en-US" dirty="0"/>
           </a:p>
@@ -975,7 +977,7 @@
           <a:p>
             <a:fld id="{48A87A34-81AB-432B-8DAE-1953F412C126}" type="datetimeFigureOut">
               <a:rPr lang="en-US" smtClean="0"/>
-              <a:t>9/14/2019</a:t>
+              <a:t>9/15/2019</a:t>
             </a:fld>
             <a:endParaRPr lang="en-US" dirty="0"/>
           </a:p>
@@ -1196,7 +1198,7 @@
           <a:p>
             <a:fld id="{48A87A34-81AB-432B-8DAE-1953F412C126}" type="datetimeFigureOut">
               <a:rPr lang="en-US" smtClean="0"/>
-              <a:t>9/14/2019</a:t>
+              <a:t>9/15/2019</a:t>
             </a:fld>
             <a:endParaRPr lang="en-US" dirty="0"/>
           </a:p>
@@ -1376,7 +1378,7 @@
           <a:p>
             <a:fld id="{48A87A34-81AB-432B-8DAE-1953F412C126}" type="datetimeFigureOut">
               <a:rPr lang="en-US" smtClean="0"/>
-              <a:t>9/14/2019</a:t>
+              <a:t>9/15/2019</a:t>
             </a:fld>
             <a:endParaRPr lang="en-US" dirty="0"/>
           </a:p>
@@ -1546,7 +1548,7 @@
           <a:p>
             <a:fld id="{48A87A34-81AB-432B-8DAE-1953F412C126}" type="datetimeFigureOut">
               <a:rPr lang="en-US" smtClean="0"/>
-              <a:t>9/14/2019</a:t>
+              <a:t>9/15/2019</a:t>
             </a:fld>
             <a:endParaRPr lang="en-US" dirty="0"/>
           </a:p>
@@ -1797,7 +1799,7 @@
           <a:p>
             <a:fld id="{48A87A34-81AB-432B-8DAE-1953F412C126}" type="datetimeFigureOut">
               <a:rPr lang="en-US" smtClean="0"/>
-              <a:t>9/14/2019</a:t>
+              <a:t>9/15/2019</a:t>
             </a:fld>
             <a:endParaRPr lang="en-US" dirty="0"/>
           </a:p>
@@ -2120,7 +2122,7 @@
           <a:p>
             <a:fld id="{48A87A34-81AB-432B-8DAE-1953F412C126}" type="datetimeFigureOut">
               <a:rPr lang="en-US" smtClean="0"/>
-              <a:t>9/14/2019</a:t>
+              <a:t>9/15/2019</a:t>
             </a:fld>
             <a:endParaRPr lang="en-US" dirty="0"/>
           </a:p>
@@ -2544,7 +2546,7 @@
           <a:p>
             <a:fld id="{48A87A34-81AB-432B-8DAE-1953F412C126}" type="datetimeFigureOut">
               <a:rPr lang="en-US" smtClean="0"/>
-              <a:t>9/14/2019</a:t>
+              <a:t>9/15/2019</a:t>
             </a:fld>
             <a:endParaRPr lang="en-US" dirty="0"/>
           </a:p>
@@ -2662,7 +2664,7 @@
           <a:p>
             <a:fld id="{48A87A34-81AB-432B-8DAE-1953F412C126}" type="datetimeFigureOut">
               <a:rPr lang="en-US" smtClean="0"/>
-              <a:t>9/14/2019</a:t>
+              <a:t>9/15/2019</a:t>
             </a:fld>
             <a:endParaRPr lang="en-US" dirty="0"/>
           </a:p>
@@ -2757,7 +2759,7 @@
           <a:p>
             <a:fld id="{48A87A34-81AB-432B-8DAE-1953F412C126}" type="datetimeFigureOut">
               <a:rPr lang="en-US" smtClean="0"/>
-              <a:t>9/14/2019</a:t>
+              <a:t>9/15/2019</a:t>
             </a:fld>
             <a:endParaRPr lang="en-US" dirty="0"/>
           </a:p>
@@ -3047,7 +3049,7 @@
           <a:p>
             <a:fld id="{48A87A34-81AB-432B-8DAE-1953F412C126}" type="datetimeFigureOut">
               <a:rPr lang="en-US" smtClean="0"/>
-              <a:t>9/14/2019</a:t>
+              <a:t>9/15/2019</a:t>
             </a:fld>
             <a:endParaRPr lang="en-US" dirty="0"/>
           </a:p>
@@ -3320,7 +3322,7 @@
             <a:fld id="{48A87A34-81AB-432B-8DAE-1953F412C126}" type="datetimeFigureOut">
               <a:rPr lang="en-US" smtClean="0"/>
               <a:pPr/>
-              <a:t>9/14/2019</a:t>
+              <a:t>9/15/2019</a:t>
             </a:fld>
             <a:endParaRPr lang="en-US" dirty="0"/>
           </a:p>
@@ -3575,7 +3577,7 @@
             <a:fld id="{48A87A34-81AB-432B-8DAE-1953F412C126}" type="datetimeFigureOut">
               <a:rPr lang="en-US" smtClean="0"/>
               <a:pPr/>
-              <a:t>9/14/2019</a:t>
+              <a:t>9/15/2019</a:t>
             </a:fld>
             <a:endParaRPr lang="en-US" dirty="0"/>
           </a:p>
@@ -4258,6 +4260,649 @@
         </p:nvSpPr>
         <p:spPr/>
         <p:txBody>
+          <a:bodyPr>
+            <a:normAutofit/>
+          </a:bodyPr>
+          <a:lstStyle/>
+          <a:p>
+            <a:pPr marL="45720" indent="0">
+              <a:buNone/>
+            </a:pPr>
+            <a:r>
+              <a:rPr lang="en-AU" sz="2400" b="1" dirty="0"/>
+              <a:t>Question:</a:t>
+            </a:r>
+          </a:p>
+          <a:p>
+            <a:pPr marL="45720" indent="0">
+              <a:buNone/>
+            </a:pPr>
+            <a:r>
+              <a:rPr lang="en-AU" sz="2400" dirty="0"/>
+              <a:t>What is the distinction between good practices and a process?</a:t>
+            </a:r>
+          </a:p>
+          <a:p>
+            <a:pPr marL="45720" indent="0">
+              <a:buNone/>
+            </a:pPr>
+            <a:endParaRPr lang="en-AU" sz="2400" dirty="0"/>
+          </a:p>
+          <a:p>
+            <a:pPr marL="45720" indent="0">
+              <a:buNone/>
+            </a:pPr>
+            <a:r>
+              <a:rPr lang="en-AU" sz="2400" b="1" dirty="0"/>
+              <a:t>Answer:</a:t>
+            </a:r>
+          </a:p>
+          <a:p>
+            <a:pPr marL="45720" indent="0">
+              <a:buNone/>
+            </a:pPr>
+            <a:r>
+              <a:rPr lang="en-AU" sz="2400" dirty="0"/>
+              <a:t>Process is just a sequence of steps to meet a goal.</a:t>
+            </a:r>
+          </a:p>
+          <a:p>
+            <a:pPr marL="45720" indent="0">
+              <a:buNone/>
+            </a:pPr>
+            <a:r>
+              <a:rPr lang="en-AU" sz="2400" dirty="0"/>
+              <a:t>Good practice is a process, widely accepted to be superior to alternatives.</a:t>
+            </a:r>
+          </a:p>
+        </p:txBody>
+      </p:sp>
+    </p:spTree>
+    <p:extLst>
+      <p:ext uri="{BB962C8B-B14F-4D97-AF65-F5344CB8AC3E}">
+        <p14:creationId xmlns:p14="http://schemas.microsoft.com/office/powerpoint/2010/main" val="2099955067"/>
+      </p:ext>
+    </p:extLst>
+  </p:cSld>
+  <p:clrMapOvr>
+    <a:masterClrMapping/>
+  </p:clrMapOvr>
+  <p:timing>
+    <p:tnLst>
+      <p:par>
+        <p:cTn id="1" dur="indefinite" restart="never" nodeType="tmRoot">
+          <p:childTnLst>
+            <p:seq concurrent="1" nextAc="seek">
+              <p:cTn id="2" dur="indefinite" nodeType="mainSeq">
+                <p:childTnLst>
+                  <p:par>
+                    <p:cTn id="3" fill="hold">
+                      <p:stCondLst>
+                        <p:cond delay="indefinite"/>
+                      </p:stCondLst>
+                      <p:childTnLst>
+                        <p:par>
+                          <p:cTn id="4" fill="hold">
+                            <p:stCondLst>
+                              <p:cond delay="0"/>
+                            </p:stCondLst>
+                            <p:childTnLst>
+                              <p:par>
+                                <p:cTn id="5" presetID="1" presetClass="entr" presetSubtype="0" fill="hold" nodeType="clickEffect">
+                                  <p:stCondLst>
+                                    <p:cond delay="0"/>
+                                  </p:stCondLst>
+                                  <p:childTnLst>
+                                    <p:set>
+                                      <p:cBhvr>
+                                        <p:cTn id="6" dur="1" fill="hold">
+                                          <p:stCondLst>
+                                            <p:cond delay="0"/>
+                                          </p:stCondLst>
+                                        </p:cTn>
+                                        <p:tgtEl>
+                                          <p:spTgt spid="3">
+                                            <p:txEl>
+                                              <p:pRg st="3" end="3"/>
+                                            </p:txEl>
+                                          </p:spTgt>
+                                        </p:tgtEl>
+                                        <p:attrNameLst>
+                                          <p:attrName>style.visibility</p:attrName>
+                                        </p:attrNameLst>
+                                      </p:cBhvr>
+                                      <p:to>
+                                        <p:strVal val="visible"/>
+                                      </p:to>
+                                    </p:set>
+                                  </p:childTnLst>
+                                </p:cTn>
+                              </p:par>
+                              <p:par>
+                                <p:cTn id="7" presetID="1" presetClass="entr" presetSubtype="0" fill="hold" nodeType="withEffect">
+                                  <p:stCondLst>
+                                    <p:cond delay="0"/>
+                                  </p:stCondLst>
+                                  <p:childTnLst>
+                                    <p:set>
+                                      <p:cBhvr>
+                                        <p:cTn id="8" dur="1" fill="hold">
+                                          <p:stCondLst>
+                                            <p:cond delay="0"/>
+                                          </p:stCondLst>
+                                        </p:cTn>
+                                        <p:tgtEl>
+                                          <p:spTgt spid="3">
+                                            <p:txEl>
+                                              <p:pRg st="4" end="4"/>
+                                            </p:txEl>
+                                          </p:spTgt>
+                                        </p:tgtEl>
+                                        <p:attrNameLst>
+                                          <p:attrName>style.visibility</p:attrName>
+                                        </p:attrNameLst>
+                                      </p:cBhvr>
+                                      <p:to>
+                                        <p:strVal val="visible"/>
+                                      </p:to>
+                                    </p:set>
+                                  </p:childTnLst>
+                                </p:cTn>
+                              </p:par>
+                              <p:par>
+                                <p:cTn id="9" presetID="1" presetClass="entr" presetSubtype="0" fill="hold" nodeType="withEffect">
+                                  <p:stCondLst>
+                                    <p:cond delay="0"/>
+                                  </p:stCondLst>
+                                  <p:childTnLst>
+                                    <p:set>
+                                      <p:cBhvr>
+                                        <p:cTn id="10" dur="1" fill="hold">
+                                          <p:stCondLst>
+                                            <p:cond delay="0"/>
+                                          </p:stCondLst>
+                                        </p:cTn>
+                                        <p:tgtEl>
+                                          <p:spTgt spid="3">
+                                            <p:txEl>
+                                              <p:pRg st="5" end="5"/>
+                                            </p:txEl>
+                                          </p:spTgt>
+                                        </p:tgtEl>
+                                        <p:attrNameLst>
+                                          <p:attrName>style.visibility</p:attrName>
+                                        </p:attrNameLst>
+                                      </p:cBhvr>
+                                      <p:to>
+                                        <p:strVal val="visible"/>
+                                      </p:to>
+                                    </p:set>
+                                  </p:childTnLst>
+                                </p:cTn>
+                              </p:par>
+                            </p:childTnLst>
+                          </p:cTn>
+                        </p:par>
+                      </p:childTnLst>
+                    </p:cTn>
+                  </p:par>
+                </p:childTnLst>
+              </p:cTn>
+              <p:prevCondLst>
+                <p:cond evt="onPrev" delay="0">
+                  <p:tgtEl>
+                    <p:sldTgt/>
+                  </p:tgtEl>
+                </p:cond>
+              </p:prevCondLst>
+              <p:nextCondLst>
+                <p:cond evt="onNext" delay="0">
+                  <p:tgtEl>
+                    <p:sldTgt/>
+                  </p:tgtEl>
+                </p:cond>
+              </p:nextCondLst>
+            </p:seq>
+          </p:childTnLst>
+        </p:cTn>
+      </p:par>
+    </p:tnLst>
+  </p:timing>
+</p:sld>
+</file>
+
+<file path=ppt/slides/slide11.xml><?xml version="1.0" encoding="utf-8"?>
+<p:sld xmlns:a="http://schemas.openxmlformats.org/drawingml/2006/main" xmlns:r="http://schemas.openxmlformats.org/officeDocument/2006/relationships" xmlns:p="http://schemas.openxmlformats.org/presentationml/2006/main">
+  <p:cSld>
+    <p:spTree>
+      <p:nvGrpSpPr>
+        <p:cNvPr id="1" name=""/>
+        <p:cNvGrpSpPr/>
+        <p:nvPr/>
+      </p:nvGrpSpPr>
+      <p:grpSpPr>
+        <a:xfrm>
+          <a:off x="0" y="0"/>
+          <a:ext cx="0" cy="0"/>
+          <a:chOff x="0" y="0"/>
+          <a:chExt cx="0" cy="0"/>
+        </a:xfrm>
+      </p:grpSpPr>
+      <p:sp>
+        <p:nvSpPr>
+          <p:cNvPr id="2" name="Title 1">
+            <a:extLst>
+              <a:ext uri="{FF2B5EF4-FFF2-40B4-BE49-F238E27FC236}">
+                <a16:creationId xmlns:a16="http://schemas.microsoft.com/office/drawing/2014/main" id="{F2153DD3-C27C-457D-ADDD-066D01CB95CA}"/>
+              </a:ext>
+            </a:extLst>
+          </p:cNvPr>
+          <p:cNvSpPr>
+            <a:spLocks noGrp="1"/>
+          </p:cNvSpPr>
+          <p:nvPr>
+            <p:ph type="title"/>
+          </p:nvPr>
+        </p:nvSpPr>
+        <p:spPr>
+          <a:xfrm>
+            <a:off x="1096766" y="244867"/>
+            <a:ext cx="9875520" cy="1356360"/>
+          </a:xfrm>
+        </p:spPr>
+        <p:txBody>
+          <a:bodyPr/>
+          <a:lstStyle/>
+          <a:p>
+            <a:r>
+              <a:rPr lang="en-US" dirty="0">
+                <a:latin typeface="Rockwell" panose="02060603020205020403" pitchFamily="18" charset="0"/>
+              </a:rPr>
+              <a:t>Discussion</a:t>
+            </a:r>
+          </a:p>
+        </p:txBody>
+      </p:sp>
+      <p:pic>
+        <p:nvPicPr>
+          <p:cNvPr id="5" name="Graphic 4" descr="Teacher">
+            <a:extLst>
+              <a:ext uri="{FF2B5EF4-FFF2-40B4-BE49-F238E27FC236}">
+                <a16:creationId xmlns:a16="http://schemas.microsoft.com/office/drawing/2014/main" id="{79AA3F49-E7A4-4660-84DA-0DC43809C2DB}"/>
+              </a:ext>
+            </a:extLst>
+          </p:cNvPr>
+          <p:cNvPicPr>
+            <a:picLocks noChangeAspect="1"/>
+          </p:cNvPicPr>
+          <p:nvPr/>
+        </p:nvPicPr>
+        <p:blipFill>
+          <a:blip r:embed="rId2">
+            <a:extLst>
+              <a:ext uri="{96DAC541-7B7A-43D3-8B79-37D633B846F1}">
+                <asvg:svgBlip xmlns:asvg="http://schemas.microsoft.com/office/drawing/2016/SVG/main" r:embed="rId3"/>
+              </a:ext>
+            </a:extLst>
+          </a:blip>
+          <a:stretch>
+            <a:fillRect/>
+          </a:stretch>
+        </p:blipFill>
+        <p:spPr>
+          <a:xfrm>
+            <a:off x="4280263" y="465847"/>
+            <a:ext cx="914400" cy="914400"/>
+          </a:xfrm>
+          <a:prstGeom prst="rect">
+            <a:avLst/>
+          </a:prstGeom>
+        </p:spPr>
+      </p:pic>
+      <p:sp>
+        <p:nvSpPr>
+          <p:cNvPr id="3" name="Content Placeholder 2">
+            <a:extLst>
+              <a:ext uri="{FF2B5EF4-FFF2-40B4-BE49-F238E27FC236}">
+                <a16:creationId xmlns:a16="http://schemas.microsoft.com/office/drawing/2014/main" id="{C212DA85-9288-495A-A4BE-E87C9AC81A60}"/>
+              </a:ext>
+            </a:extLst>
+          </p:cNvPr>
+          <p:cNvSpPr>
+            <a:spLocks noGrp="1"/>
+          </p:cNvSpPr>
+          <p:nvPr>
+            <p:ph idx="1"/>
+          </p:nvPr>
+        </p:nvSpPr>
+        <p:spPr/>
+        <p:txBody>
+          <a:bodyPr>
+            <a:normAutofit/>
+          </a:bodyPr>
+          <a:lstStyle/>
+          <a:p>
+            <a:pPr marL="45720" indent="0">
+              <a:buNone/>
+            </a:pPr>
+            <a:r>
+              <a:rPr lang="en-AU" sz="2400" b="1" dirty="0"/>
+              <a:t>Question:</a:t>
+            </a:r>
+          </a:p>
+          <a:p>
+            <a:pPr marL="45720" indent="0">
+              <a:buNone/>
+            </a:pPr>
+            <a:r>
+              <a:rPr lang="en-AU" sz="2400" dirty="0"/>
+              <a:t>What are traits you believe make good team members?</a:t>
+            </a:r>
+          </a:p>
+          <a:p>
+            <a:pPr marL="45720" indent="0">
+              <a:buNone/>
+            </a:pPr>
+            <a:r>
+              <a:rPr lang="en-AU" sz="2400" dirty="0"/>
+              <a:t>How do you decide who is on your team?</a:t>
+            </a:r>
+          </a:p>
+          <a:p>
+            <a:pPr marL="45720" indent="0">
+              <a:buNone/>
+            </a:pPr>
+            <a:endParaRPr lang="en-AU" sz="2400" dirty="0"/>
+          </a:p>
+          <a:p>
+            <a:pPr marL="45720" indent="0">
+              <a:buNone/>
+            </a:pPr>
+            <a:r>
+              <a:rPr lang="en-AU" sz="2400" b="1" dirty="0"/>
+              <a:t>My opinion:</a:t>
+            </a:r>
+          </a:p>
+          <a:p>
+            <a:pPr marL="45720" indent="0">
+              <a:buNone/>
+            </a:pPr>
+            <a:r>
+              <a:rPr lang="en-AU" sz="2400" dirty="0"/>
+              <a:t>Friendly, empathetic, punctual and willing to learn.</a:t>
+            </a:r>
+          </a:p>
+          <a:p>
+            <a:pPr marL="45720" indent="0">
+              <a:buNone/>
+            </a:pPr>
+            <a:r>
+              <a:rPr lang="en-AU" sz="2400" dirty="0"/>
+              <a:t>Skill is a secondary trait for me. </a:t>
+            </a:r>
+          </a:p>
+        </p:txBody>
+      </p:sp>
+    </p:spTree>
+    <p:extLst>
+      <p:ext uri="{BB962C8B-B14F-4D97-AF65-F5344CB8AC3E}">
+        <p14:creationId xmlns:p14="http://schemas.microsoft.com/office/powerpoint/2010/main" val="1993043609"/>
+      </p:ext>
+    </p:extLst>
+  </p:cSld>
+  <p:clrMapOvr>
+    <a:masterClrMapping/>
+  </p:clrMapOvr>
+  <p:timing>
+    <p:tnLst>
+      <p:par>
+        <p:cTn id="1" dur="indefinite" restart="never" nodeType="tmRoot">
+          <p:childTnLst>
+            <p:seq concurrent="1" nextAc="seek">
+              <p:cTn id="2" dur="indefinite" nodeType="mainSeq">
+                <p:childTnLst>
+                  <p:par>
+                    <p:cTn id="3" fill="hold">
+                      <p:stCondLst>
+                        <p:cond delay="indefinite"/>
+                      </p:stCondLst>
+                      <p:childTnLst>
+                        <p:par>
+                          <p:cTn id="4" fill="hold">
+                            <p:stCondLst>
+                              <p:cond delay="0"/>
+                            </p:stCondLst>
+                            <p:childTnLst>
+                              <p:par>
+                                <p:cTn id="5" presetID="1" presetClass="entr" presetSubtype="0" fill="hold" nodeType="clickEffect">
+                                  <p:stCondLst>
+                                    <p:cond delay="0"/>
+                                  </p:stCondLst>
+                                  <p:childTnLst>
+                                    <p:set>
+                                      <p:cBhvr>
+                                        <p:cTn id="6" dur="1" fill="hold">
+                                          <p:stCondLst>
+                                            <p:cond delay="0"/>
+                                          </p:stCondLst>
+                                        </p:cTn>
+                                        <p:tgtEl>
+                                          <p:spTgt spid="3">
+                                            <p:txEl>
+                                              <p:pRg st="4" end="4"/>
+                                            </p:txEl>
+                                          </p:spTgt>
+                                        </p:tgtEl>
+                                        <p:attrNameLst>
+                                          <p:attrName>style.visibility</p:attrName>
+                                        </p:attrNameLst>
+                                      </p:cBhvr>
+                                      <p:to>
+                                        <p:strVal val="visible"/>
+                                      </p:to>
+                                    </p:set>
+                                  </p:childTnLst>
+                                </p:cTn>
+                              </p:par>
+                              <p:par>
+                                <p:cTn id="7" presetID="1" presetClass="entr" presetSubtype="0" fill="hold" nodeType="withEffect">
+                                  <p:stCondLst>
+                                    <p:cond delay="0"/>
+                                  </p:stCondLst>
+                                  <p:childTnLst>
+                                    <p:set>
+                                      <p:cBhvr>
+                                        <p:cTn id="8" dur="1" fill="hold">
+                                          <p:stCondLst>
+                                            <p:cond delay="0"/>
+                                          </p:stCondLst>
+                                        </p:cTn>
+                                        <p:tgtEl>
+                                          <p:spTgt spid="3">
+                                            <p:txEl>
+                                              <p:pRg st="5" end="5"/>
+                                            </p:txEl>
+                                          </p:spTgt>
+                                        </p:tgtEl>
+                                        <p:attrNameLst>
+                                          <p:attrName>style.visibility</p:attrName>
+                                        </p:attrNameLst>
+                                      </p:cBhvr>
+                                      <p:to>
+                                        <p:strVal val="visible"/>
+                                      </p:to>
+                                    </p:set>
+                                  </p:childTnLst>
+                                </p:cTn>
+                              </p:par>
+                              <p:par>
+                                <p:cTn id="9" presetID="1" presetClass="entr" presetSubtype="0" fill="hold" nodeType="withEffect">
+                                  <p:stCondLst>
+                                    <p:cond delay="0"/>
+                                  </p:stCondLst>
+                                  <p:childTnLst>
+                                    <p:set>
+                                      <p:cBhvr>
+                                        <p:cTn id="10" dur="1" fill="hold">
+                                          <p:stCondLst>
+                                            <p:cond delay="0"/>
+                                          </p:stCondLst>
+                                        </p:cTn>
+                                        <p:tgtEl>
+                                          <p:spTgt spid="3">
+                                            <p:txEl>
+                                              <p:pRg st="6" end="6"/>
+                                            </p:txEl>
+                                          </p:spTgt>
+                                        </p:tgtEl>
+                                        <p:attrNameLst>
+                                          <p:attrName>style.visibility</p:attrName>
+                                        </p:attrNameLst>
+                                      </p:cBhvr>
+                                      <p:to>
+                                        <p:strVal val="visible"/>
+                                      </p:to>
+                                    </p:set>
+                                  </p:childTnLst>
+                                </p:cTn>
+                              </p:par>
+                            </p:childTnLst>
+                          </p:cTn>
+                        </p:par>
+                      </p:childTnLst>
+                    </p:cTn>
+                  </p:par>
+                </p:childTnLst>
+              </p:cTn>
+              <p:prevCondLst>
+                <p:cond evt="onPrev" delay="0">
+                  <p:tgtEl>
+                    <p:sldTgt/>
+                  </p:tgtEl>
+                </p:cond>
+              </p:prevCondLst>
+              <p:nextCondLst>
+                <p:cond evt="onNext" delay="0">
+                  <p:tgtEl>
+                    <p:sldTgt/>
+                  </p:tgtEl>
+                </p:cond>
+              </p:nextCondLst>
+            </p:seq>
+          </p:childTnLst>
+        </p:cTn>
+      </p:par>
+    </p:tnLst>
+  </p:timing>
+</p:sld>
+</file>
+
+<file path=ppt/slides/slide12.xml><?xml version="1.0" encoding="utf-8"?>
+<p:sld xmlns:a="http://schemas.openxmlformats.org/drawingml/2006/main" xmlns:r="http://schemas.openxmlformats.org/officeDocument/2006/relationships" xmlns:p="http://schemas.openxmlformats.org/presentationml/2006/main">
+  <p:cSld>
+    <p:spTree>
+      <p:nvGrpSpPr>
+        <p:cNvPr id="1" name=""/>
+        <p:cNvGrpSpPr/>
+        <p:nvPr/>
+      </p:nvGrpSpPr>
+      <p:grpSpPr>
+        <a:xfrm>
+          <a:off x="0" y="0"/>
+          <a:ext cx="0" cy="0"/>
+          <a:chOff x="0" y="0"/>
+          <a:chExt cx="0" cy="0"/>
+        </a:xfrm>
+      </p:grpSpPr>
+      <p:sp>
+        <p:nvSpPr>
+          <p:cNvPr id="2" name="Title 1">
+            <a:extLst>
+              <a:ext uri="{FF2B5EF4-FFF2-40B4-BE49-F238E27FC236}">
+                <a16:creationId xmlns:a16="http://schemas.microsoft.com/office/drawing/2014/main" id="{F2153DD3-C27C-457D-ADDD-066D01CB95CA}"/>
+              </a:ext>
+            </a:extLst>
+          </p:cNvPr>
+          <p:cNvSpPr>
+            <a:spLocks noGrp="1"/>
+          </p:cNvSpPr>
+          <p:nvPr>
+            <p:ph type="title"/>
+          </p:nvPr>
+        </p:nvSpPr>
+        <p:spPr>
+          <a:xfrm>
+            <a:off x="1096766" y="244867"/>
+            <a:ext cx="9875520" cy="1356360"/>
+          </a:xfrm>
+        </p:spPr>
+        <p:txBody>
+          <a:bodyPr/>
+          <a:lstStyle/>
+          <a:p>
+            <a:r>
+              <a:rPr lang="en-US" dirty="0">
+                <a:latin typeface="Rockwell" panose="02060603020205020403" pitchFamily="18" charset="0"/>
+              </a:rPr>
+              <a:t>Discussion</a:t>
+            </a:r>
+          </a:p>
+        </p:txBody>
+      </p:sp>
+      <p:pic>
+        <p:nvPicPr>
+          <p:cNvPr id="5" name="Graphic 4" descr="Teacher">
+            <a:extLst>
+              <a:ext uri="{FF2B5EF4-FFF2-40B4-BE49-F238E27FC236}">
+                <a16:creationId xmlns:a16="http://schemas.microsoft.com/office/drawing/2014/main" id="{79AA3F49-E7A4-4660-84DA-0DC43809C2DB}"/>
+              </a:ext>
+            </a:extLst>
+          </p:cNvPr>
+          <p:cNvPicPr>
+            <a:picLocks noChangeAspect="1"/>
+          </p:cNvPicPr>
+          <p:nvPr/>
+        </p:nvPicPr>
+        <p:blipFill>
+          <a:blip r:embed="rId2">
+            <a:extLst>
+              <a:ext uri="{96DAC541-7B7A-43D3-8B79-37D633B846F1}">
+                <asvg:svgBlip xmlns:asvg="http://schemas.microsoft.com/office/drawing/2016/SVG/main" r:embed="rId3"/>
+              </a:ext>
+            </a:extLst>
+          </a:blip>
+          <a:stretch>
+            <a:fillRect/>
+          </a:stretch>
+        </p:blipFill>
+        <p:spPr>
+          <a:xfrm>
+            <a:off x="4280263" y="465847"/>
+            <a:ext cx="914400" cy="914400"/>
+          </a:xfrm>
+          <a:prstGeom prst="rect">
+            <a:avLst/>
+          </a:prstGeom>
+        </p:spPr>
+      </p:pic>
+      <p:sp>
+        <p:nvSpPr>
+          <p:cNvPr id="3" name="Content Placeholder 2">
+            <a:extLst>
+              <a:ext uri="{FF2B5EF4-FFF2-40B4-BE49-F238E27FC236}">
+                <a16:creationId xmlns:a16="http://schemas.microsoft.com/office/drawing/2014/main" id="{C212DA85-9288-495A-A4BE-E87C9AC81A60}"/>
+              </a:ext>
+            </a:extLst>
+          </p:cNvPr>
+          <p:cNvSpPr>
+            <a:spLocks noGrp="1"/>
+          </p:cNvSpPr>
+          <p:nvPr>
+            <p:ph idx="1"/>
+          </p:nvPr>
+        </p:nvSpPr>
+        <p:spPr/>
+        <p:txBody>
           <a:bodyPr/>
           <a:lstStyle/>
           <a:p>
@@ -4556,7 +5201,7 @@
 </p:sld>
 </file>
 
-<file path=ppt/slides/slide11.xml><?xml version="1.0" encoding="utf-8"?>
+<file path=ppt/slides/slide13.xml><?xml version="1.0" encoding="utf-8"?>
 <p:sld xmlns:a="http://schemas.openxmlformats.org/drawingml/2006/main" xmlns:r="http://schemas.openxmlformats.org/officeDocument/2006/relationships" xmlns:p="http://schemas.openxmlformats.org/presentationml/2006/main">
   <p:cSld>
     <p:spTree>
@@ -4678,7 +5323,7 @@
 </p:sld>
 </file>
 
-<file path=ppt/slides/slide12.xml><?xml version="1.0" encoding="utf-8"?>
+<file path=ppt/slides/slide14.xml><?xml version="1.0" encoding="utf-8"?>
 <p:sld xmlns:a="http://schemas.openxmlformats.org/drawingml/2006/main" xmlns:r="http://schemas.openxmlformats.org/officeDocument/2006/relationships" xmlns:p="http://schemas.openxmlformats.org/presentationml/2006/main">
   <p:cSld>
     <p:spTree>
@@ -4862,7 +5507,7 @@
 </p:sld>
 </file>
 
-<file path=ppt/slides/slide13.xml><?xml version="1.0" encoding="utf-8"?>
+<file path=ppt/slides/slide15.xml><?xml version="1.0" encoding="utf-8"?>
 <p:sld xmlns:a="http://schemas.openxmlformats.org/drawingml/2006/main" xmlns:r="http://schemas.openxmlformats.org/officeDocument/2006/relationships" xmlns:p="http://schemas.openxmlformats.org/presentationml/2006/main">
   <p:cSld>
     <p:spTree>
@@ -5056,6 +5701,266 @@
               <a:rPr lang="en-US" dirty="0">
                 <a:latin typeface="Rockwell" panose="02060603020205020403" pitchFamily="18" charset="0"/>
               </a:rPr>
+              <a:t>About me</a:t>
+            </a:r>
+          </a:p>
+        </p:txBody>
+      </p:sp>
+      <p:sp>
+        <p:nvSpPr>
+          <p:cNvPr id="3" name="Content Placeholder 2">
+            <a:extLst>
+              <a:ext uri="{FF2B5EF4-FFF2-40B4-BE49-F238E27FC236}">
+                <a16:creationId xmlns:a16="http://schemas.microsoft.com/office/drawing/2014/main" id="{43A80DFA-9D8A-4100-99A9-1E50AE885FDE}"/>
+              </a:ext>
+            </a:extLst>
+          </p:cNvPr>
+          <p:cNvSpPr>
+            <a:spLocks noGrp="1"/>
+          </p:cNvSpPr>
+          <p:nvPr>
+            <p:ph idx="1"/>
+          </p:nvPr>
+        </p:nvSpPr>
+        <p:spPr/>
+        <p:txBody>
+          <a:bodyPr>
+            <a:normAutofit/>
+          </a:bodyPr>
+          <a:lstStyle/>
+          <a:p>
+            <a:r>
+              <a:rPr lang="en-AU" sz="2400" dirty="0"/>
+              <a:t>3</a:t>
+            </a:r>
+            <a:r>
+              <a:rPr lang="en-AU" sz="2400" baseline="30000" dirty="0"/>
+              <a:t>rd</a:t>
+            </a:r>
+            <a:r>
+              <a:rPr lang="en-AU" sz="2400" dirty="0"/>
+              <a:t> Year, Computer Science/Commerce</a:t>
+            </a:r>
+          </a:p>
+          <a:p>
+            <a:endParaRPr lang="en-AU" sz="2400" dirty="0"/>
+          </a:p>
+          <a:p>
+            <a:r>
+              <a:rPr lang="en-AU" sz="2400" dirty="0"/>
+              <a:t>3</a:t>
+            </a:r>
+            <a:r>
+              <a:rPr lang="en-AU" sz="2400" baseline="30000" dirty="0"/>
+              <a:t>rd</a:t>
+            </a:r>
+            <a:r>
+              <a:rPr lang="en-AU" sz="2400" dirty="0"/>
+              <a:t> semester teaching 1531</a:t>
+            </a:r>
+          </a:p>
+          <a:p>
+            <a:endParaRPr lang="en-AU" sz="2400" dirty="0"/>
+          </a:p>
+          <a:p>
+            <a:r>
+              <a:rPr lang="en-AU" sz="2400" dirty="0"/>
+              <a:t>Interested in AI, and Full Stack Development.</a:t>
+            </a:r>
+          </a:p>
+        </p:txBody>
+      </p:sp>
+    </p:spTree>
+    <p:extLst>
+      <p:ext uri="{BB962C8B-B14F-4D97-AF65-F5344CB8AC3E}">
+        <p14:creationId xmlns:p14="http://schemas.microsoft.com/office/powerpoint/2010/main" val="434236312"/>
+      </p:ext>
+    </p:extLst>
+  </p:cSld>
+  <p:clrMapOvr>
+    <a:masterClrMapping/>
+  </p:clrMapOvr>
+</p:sld>
+</file>
+
+<file path=ppt/slides/slide3.xml><?xml version="1.0" encoding="utf-8"?>
+<p:sld xmlns:a="http://schemas.openxmlformats.org/drawingml/2006/main" xmlns:r="http://schemas.openxmlformats.org/officeDocument/2006/relationships" xmlns:p="http://schemas.openxmlformats.org/presentationml/2006/main">
+  <p:cSld>
+    <p:spTree>
+      <p:nvGrpSpPr>
+        <p:cNvPr id="1" name=""/>
+        <p:cNvGrpSpPr/>
+        <p:nvPr/>
+      </p:nvGrpSpPr>
+      <p:grpSpPr>
+        <a:xfrm>
+          <a:off x="0" y="0"/>
+          <a:ext cx="0" cy="0"/>
+          <a:chOff x="0" y="0"/>
+          <a:chExt cx="0" cy="0"/>
+        </a:xfrm>
+      </p:grpSpPr>
+      <p:sp>
+        <p:nvSpPr>
+          <p:cNvPr id="2" name="Title 1">
+            <a:extLst>
+              <a:ext uri="{FF2B5EF4-FFF2-40B4-BE49-F238E27FC236}">
+                <a16:creationId xmlns:a16="http://schemas.microsoft.com/office/drawing/2014/main" id="{F2153DD3-C27C-457D-ADDD-066D01CB95CA}"/>
+              </a:ext>
+            </a:extLst>
+          </p:cNvPr>
+          <p:cNvSpPr>
+            <a:spLocks noGrp="1"/>
+          </p:cNvSpPr>
+          <p:nvPr>
+            <p:ph type="title"/>
+          </p:nvPr>
+        </p:nvSpPr>
+        <p:spPr>
+          <a:xfrm>
+            <a:off x="1140144" y="231140"/>
+            <a:ext cx="9875520" cy="1356360"/>
+          </a:xfrm>
+        </p:spPr>
+        <p:txBody>
+          <a:bodyPr/>
+          <a:lstStyle/>
+          <a:p>
+            <a:r>
+              <a:rPr lang="en-US" dirty="0">
+                <a:latin typeface="Rockwell" panose="02060603020205020403" pitchFamily="18" charset="0"/>
+              </a:rPr>
+              <a:t>Expectations</a:t>
+            </a:r>
+          </a:p>
+        </p:txBody>
+      </p:sp>
+      <p:sp>
+        <p:nvSpPr>
+          <p:cNvPr id="3" name="Content Placeholder 2">
+            <a:extLst>
+              <a:ext uri="{FF2B5EF4-FFF2-40B4-BE49-F238E27FC236}">
+                <a16:creationId xmlns:a16="http://schemas.microsoft.com/office/drawing/2014/main" id="{43A80DFA-9D8A-4100-99A9-1E50AE885FDE}"/>
+              </a:ext>
+            </a:extLst>
+          </p:cNvPr>
+          <p:cNvSpPr>
+            <a:spLocks noGrp="1"/>
+          </p:cNvSpPr>
+          <p:nvPr>
+            <p:ph idx="1"/>
+          </p:nvPr>
+        </p:nvSpPr>
+        <p:spPr/>
+        <p:txBody>
+          <a:bodyPr>
+            <a:normAutofit/>
+          </a:bodyPr>
+          <a:lstStyle/>
+          <a:p>
+            <a:r>
+              <a:rPr lang="en-AU" sz="2400" dirty="0"/>
+              <a:t>Ask for help! (after trying to solve the problem yourself)</a:t>
+            </a:r>
+          </a:p>
+          <a:p>
+            <a:endParaRPr lang="en-AU" sz="2400" dirty="0"/>
+          </a:p>
+          <a:p>
+            <a:r>
+              <a:rPr lang="en-AU" sz="2400" dirty="0"/>
+              <a:t>Respect other’s right to learn</a:t>
+            </a:r>
+          </a:p>
+          <a:p>
+            <a:pPr marL="45720" indent="0">
+              <a:buNone/>
+            </a:pPr>
+            <a:endParaRPr lang="en-AU" sz="2400" dirty="0"/>
+          </a:p>
+          <a:p>
+            <a:r>
+              <a:rPr lang="en-AU" sz="2400" dirty="0"/>
+              <a:t>Participate if you can</a:t>
+            </a:r>
+          </a:p>
+          <a:p>
+            <a:endParaRPr lang="en-AU" sz="2400" dirty="0"/>
+          </a:p>
+          <a:p>
+            <a:r>
+              <a:rPr lang="en-AU" sz="2400" dirty="0"/>
+              <a:t>Provide feedback as soon as possible</a:t>
+            </a:r>
+          </a:p>
+          <a:p>
+            <a:pPr marL="45720" indent="0">
+              <a:buNone/>
+            </a:pPr>
+            <a:endParaRPr lang="en-AU" sz="2400" dirty="0"/>
+          </a:p>
+        </p:txBody>
+      </p:sp>
+    </p:spTree>
+    <p:extLst>
+      <p:ext uri="{BB962C8B-B14F-4D97-AF65-F5344CB8AC3E}">
+        <p14:creationId xmlns:p14="http://schemas.microsoft.com/office/powerpoint/2010/main" val="319461745"/>
+      </p:ext>
+    </p:extLst>
+  </p:cSld>
+  <p:clrMapOvr>
+    <a:masterClrMapping/>
+  </p:clrMapOvr>
+</p:sld>
+</file>
+
+<file path=ppt/slides/slide4.xml><?xml version="1.0" encoding="utf-8"?>
+<p:sld xmlns:a="http://schemas.openxmlformats.org/drawingml/2006/main" xmlns:r="http://schemas.openxmlformats.org/officeDocument/2006/relationships" xmlns:p="http://schemas.openxmlformats.org/presentationml/2006/main">
+  <p:cSld>
+    <p:spTree>
+      <p:nvGrpSpPr>
+        <p:cNvPr id="1" name=""/>
+        <p:cNvGrpSpPr/>
+        <p:nvPr/>
+      </p:nvGrpSpPr>
+      <p:grpSpPr>
+        <a:xfrm>
+          <a:off x="0" y="0"/>
+          <a:ext cx="0" cy="0"/>
+          <a:chOff x="0" y="0"/>
+          <a:chExt cx="0" cy="0"/>
+        </a:xfrm>
+      </p:grpSpPr>
+      <p:sp>
+        <p:nvSpPr>
+          <p:cNvPr id="2" name="Title 1">
+            <a:extLst>
+              <a:ext uri="{FF2B5EF4-FFF2-40B4-BE49-F238E27FC236}">
+                <a16:creationId xmlns:a16="http://schemas.microsoft.com/office/drawing/2014/main" id="{F2153DD3-C27C-457D-ADDD-066D01CB95CA}"/>
+              </a:ext>
+            </a:extLst>
+          </p:cNvPr>
+          <p:cNvSpPr>
+            <a:spLocks noGrp="1"/>
+          </p:cNvSpPr>
+          <p:nvPr>
+            <p:ph type="title"/>
+          </p:nvPr>
+        </p:nvSpPr>
+        <p:spPr>
+          <a:xfrm>
+            <a:off x="1140144" y="231140"/>
+            <a:ext cx="9875520" cy="1356360"/>
+          </a:xfrm>
+        </p:spPr>
+        <p:txBody>
+          <a:bodyPr/>
+          <a:lstStyle/>
+          <a:p>
+            <a:r>
+              <a:rPr lang="en-US" dirty="0">
+                <a:latin typeface="Rockwell" panose="02060603020205020403" pitchFamily="18" charset="0"/>
+              </a:rPr>
               <a:t>Introduce Yourselves!</a:t>
             </a:r>
           </a:p>
@@ -5122,7 +6027,7 @@
 </p:sld>
 </file>
 
-<file path=ppt/slides/slide3.xml><?xml version="1.0" encoding="utf-8"?>
+<file path=ppt/slides/slide5.xml><?xml version="1.0" encoding="utf-8"?>
 <p:sld xmlns:a="http://schemas.openxmlformats.org/drawingml/2006/main" xmlns:r="http://schemas.openxmlformats.org/officeDocument/2006/relationships" xmlns:p="http://schemas.openxmlformats.org/presentationml/2006/main">
   <p:cSld>
     <p:spTree>
@@ -5305,7 +6210,7 @@
 </p:sld>
 </file>
 
-<file path=ppt/slides/slide4.xml><?xml version="1.0" encoding="utf-8"?>
+<file path=ppt/slides/slide6.xml><?xml version="1.0" encoding="utf-8"?>
 <p:sld xmlns:a="http://schemas.openxmlformats.org/drawingml/2006/main" xmlns:r="http://schemas.openxmlformats.org/officeDocument/2006/relationships" xmlns:p="http://schemas.openxmlformats.org/presentationml/2006/main">
   <p:cSld>
     <p:spTree>
@@ -5598,7 +6503,7 @@
 </p:sld>
 </file>
 
-<file path=ppt/slides/slide5.xml><?xml version="1.0" encoding="utf-8"?>
+<file path=ppt/slides/slide7.xml><?xml version="1.0" encoding="utf-8"?>
 <p:sld xmlns:a="http://schemas.openxmlformats.org/drawingml/2006/main" xmlns:r="http://schemas.openxmlformats.org/officeDocument/2006/relationships" xmlns:p="http://schemas.openxmlformats.org/presentationml/2006/main">
   <p:cSld>
     <p:spTree>
@@ -5919,7 +6824,7 @@
 </p:sld>
 </file>
 
-<file path=ppt/slides/slide6.xml><?xml version="1.0" encoding="utf-8"?>
+<file path=ppt/slides/slide8.xml><?xml version="1.0" encoding="utf-8"?>
 <p:sld xmlns:a="http://schemas.openxmlformats.org/drawingml/2006/main" xmlns:r="http://schemas.openxmlformats.org/officeDocument/2006/relationships" xmlns:p="http://schemas.openxmlformats.org/presentationml/2006/main">
   <p:cSld>
     <p:spTree>
@@ -6276,7 +7181,7 @@
 </p:sld>
 </file>
 
-<file path=ppt/slides/slide7.xml><?xml version="1.0" encoding="utf-8"?>
+<file path=ppt/slides/slide9.xml><?xml version="1.0" encoding="utf-8"?>
 <p:sld xmlns:a="http://schemas.openxmlformats.org/drawingml/2006/main" xmlns:r="http://schemas.openxmlformats.org/officeDocument/2006/relationships" xmlns:p="http://schemas.openxmlformats.org/presentationml/2006/main">
   <p:cSld>
     <p:spTree>
@@ -6580,649 +7485,6 @@
                                     <p:set>
                                       <p:cBhvr>
                                         <p:cTn id="12" dur="1" fill="hold">
-                                          <p:stCondLst>
-                                            <p:cond delay="0"/>
-                                          </p:stCondLst>
-                                        </p:cTn>
-                                        <p:tgtEl>
-                                          <p:spTgt spid="3">
-                                            <p:txEl>
-                                              <p:pRg st="6" end="6"/>
-                                            </p:txEl>
-                                          </p:spTgt>
-                                        </p:tgtEl>
-                                        <p:attrNameLst>
-                                          <p:attrName>style.visibility</p:attrName>
-                                        </p:attrNameLst>
-                                      </p:cBhvr>
-                                      <p:to>
-                                        <p:strVal val="visible"/>
-                                      </p:to>
-                                    </p:set>
-                                  </p:childTnLst>
-                                </p:cTn>
-                              </p:par>
-                            </p:childTnLst>
-                          </p:cTn>
-                        </p:par>
-                      </p:childTnLst>
-                    </p:cTn>
-                  </p:par>
-                </p:childTnLst>
-              </p:cTn>
-              <p:prevCondLst>
-                <p:cond evt="onPrev" delay="0">
-                  <p:tgtEl>
-                    <p:sldTgt/>
-                  </p:tgtEl>
-                </p:cond>
-              </p:prevCondLst>
-              <p:nextCondLst>
-                <p:cond evt="onNext" delay="0">
-                  <p:tgtEl>
-                    <p:sldTgt/>
-                  </p:tgtEl>
-                </p:cond>
-              </p:nextCondLst>
-            </p:seq>
-          </p:childTnLst>
-        </p:cTn>
-      </p:par>
-    </p:tnLst>
-  </p:timing>
-</p:sld>
-</file>
-
-<file path=ppt/slides/slide8.xml><?xml version="1.0" encoding="utf-8"?>
-<p:sld xmlns:a="http://schemas.openxmlformats.org/drawingml/2006/main" xmlns:r="http://schemas.openxmlformats.org/officeDocument/2006/relationships" xmlns:p="http://schemas.openxmlformats.org/presentationml/2006/main">
-  <p:cSld>
-    <p:spTree>
-      <p:nvGrpSpPr>
-        <p:cNvPr id="1" name=""/>
-        <p:cNvGrpSpPr/>
-        <p:nvPr/>
-      </p:nvGrpSpPr>
-      <p:grpSpPr>
-        <a:xfrm>
-          <a:off x="0" y="0"/>
-          <a:ext cx="0" cy="0"/>
-          <a:chOff x="0" y="0"/>
-          <a:chExt cx="0" cy="0"/>
-        </a:xfrm>
-      </p:grpSpPr>
-      <p:sp>
-        <p:nvSpPr>
-          <p:cNvPr id="2" name="Title 1">
-            <a:extLst>
-              <a:ext uri="{FF2B5EF4-FFF2-40B4-BE49-F238E27FC236}">
-                <a16:creationId xmlns:a16="http://schemas.microsoft.com/office/drawing/2014/main" id="{F2153DD3-C27C-457D-ADDD-066D01CB95CA}"/>
-              </a:ext>
-            </a:extLst>
-          </p:cNvPr>
-          <p:cNvSpPr>
-            <a:spLocks noGrp="1"/>
-          </p:cNvSpPr>
-          <p:nvPr>
-            <p:ph type="title"/>
-          </p:nvPr>
-        </p:nvSpPr>
-        <p:spPr>
-          <a:xfrm>
-            <a:off x="1096766" y="244867"/>
-            <a:ext cx="9875520" cy="1356360"/>
-          </a:xfrm>
-        </p:spPr>
-        <p:txBody>
-          <a:bodyPr/>
-          <a:lstStyle/>
-          <a:p>
-            <a:r>
-              <a:rPr lang="en-US" dirty="0">
-                <a:latin typeface="Rockwell" panose="02060603020205020403" pitchFamily="18" charset="0"/>
-              </a:rPr>
-              <a:t>Discussion</a:t>
-            </a:r>
-          </a:p>
-        </p:txBody>
-      </p:sp>
-      <p:pic>
-        <p:nvPicPr>
-          <p:cNvPr id="5" name="Graphic 4" descr="Teacher">
-            <a:extLst>
-              <a:ext uri="{FF2B5EF4-FFF2-40B4-BE49-F238E27FC236}">
-                <a16:creationId xmlns:a16="http://schemas.microsoft.com/office/drawing/2014/main" id="{79AA3F49-E7A4-4660-84DA-0DC43809C2DB}"/>
-              </a:ext>
-            </a:extLst>
-          </p:cNvPr>
-          <p:cNvPicPr>
-            <a:picLocks noChangeAspect="1"/>
-          </p:cNvPicPr>
-          <p:nvPr/>
-        </p:nvPicPr>
-        <p:blipFill>
-          <a:blip r:embed="rId2">
-            <a:extLst>
-              <a:ext uri="{96DAC541-7B7A-43D3-8B79-37D633B846F1}">
-                <asvg:svgBlip xmlns:asvg="http://schemas.microsoft.com/office/drawing/2016/SVG/main" r:embed="rId3"/>
-              </a:ext>
-            </a:extLst>
-          </a:blip>
-          <a:stretch>
-            <a:fillRect/>
-          </a:stretch>
-        </p:blipFill>
-        <p:spPr>
-          <a:xfrm>
-            <a:off x="4280263" y="465847"/>
-            <a:ext cx="914400" cy="914400"/>
-          </a:xfrm>
-          <a:prstGeom prst="rect">
-            <a:avLst/>
-          </a:prstGeom>
-        </p:spPr>
-      </p:pic>
-      <p:sp>
-        <p:nvSpPr>
-          <p:cNvPr id="3" name="Content Placeholder 2">
-            <a:extLst>
-              <a:ext uri="{FF2B5EF4-FFF2-40B4-BE49-F238E27FC236}">
-                <a16:creationId xmlns:a16="http://schemas.microsoft.com/office/drawing/2014/main" id="{C212DA85-9288-495A-A4BE-E87C9AC81A60}"/>
-              </a:ext>
-            </a:extLst>
-          </p:cNvPr>
-          <p:cNvSpPr>
-            <a:spLocks noGrp="1"/>
-          </p:cNvSpPr>
-          <p:nvPr>
-            <p:ph idx="1"/>
-          </p:nvPr>
-        </p:nvSpPr>
-        <p:spPr/>
-        <p:txBody>
-          <a:bodyPr>
-            <a:normAutofit/>
-          </a:bodyPr>
-          <a:lstStyle/>
-          <a:p>
-            <a:pPr marL="45720" indent="0">
-              <a:buNone/>
-            </a:pPr>
-            <a:r>
-              <a:rPr lang="en-AU" sz="2400" b="1" dirty="0"/>
-              <a:t>Question:</a:t>
-            </a:r>
-          </a:p>
-          <a:p>
-            <a:pPr marL="45720" indent="0">
-              <a:buNone/>
-            </a:pPr>
-            <a:r>
-              <a:rPr lang="en-AU" sz="2400" dirty="0"/>
-              <a:t>What is the distinction between good practices and a process?</a:t>
-            </a:r>
-          </a:p>
-          <a:p>
-            <a:pPr marL="45720" indent="0">
-              <a:buNone/>
-            </a:pPr>
-            <a:endParaRPr lang="en-AU" sz="2400" dirty="0"/>
-          </a:p>
-          <a:p>
-            <a:pPr marL="45720" indent="0">
-              <a:buNone/>
-            </a:pPr>
-            <a:r>
-              <a:rPr lang="en-AU" sz="2400" b="1" dirty="0"/>
-              <a:t>Answer:</a:t>
-            </a:r>
-          </a:p>
-          <a:p>
-            <a:pPr marL="45720" indent="0">
-              <a:buNone/>
-            </a:pPr>
-            <a:r>
-              <a:rPr lang="en-AU" sz="2400" dirty="0"/>
-              <a:t>Process is just a sequence of steps to meet a goal.</a:t>
-            </a:r>
-          </a:p>
-          <a:p>
-            <a:pPr marL="45720" indent="0">
-              <a:buNone/>
-            </a:pPr>
-            <a:r>
-              <a:rPr lang="en-AU" sz="2400" dirty="0"/>
-              <a:t>Good practice is a process, widely accepted to be superior to alternatives.</a:t>
-            </a:r>
-          </a:p>
-        </p:txBody>
-      </p:sp>
-    </p:spTree>
-    <p:extLst>
-      <p:ext uri="{BB962C8B-B14F-4D97-AF65-F5344CB8AC3E}">
-        <p14:creationId xmlns:p14="http://schemas.microsoft.com/office/powerpoint/2010/main" val="2099955067"/>
-      </p:ext>
-    </p:extLst>
-  </p:cSld>
-  <p:clrMapOvr>
-    <a:masterClrMapping/>
-  </p:clrMapOvr>
-  <p:timing>
-    <p:tnLst>
-      <p:par>
-        <p:cTn id="1" dur="indefinite" restart="never" nodeType="tmRoot">
-          <p:childTnLst>
-            <p:seq concurrent="1" nextAc="seek">
-              <p:cTn id="2" dur="indefinite" nodeType="mainSeq">
-                <p:childTnLst>
-                  <p:par>
-                    <p:cTn id="3" fill="hold">
-                      <p:stCondLst>
-                        <p:cond delay="indefinite"/>
-                      </p:stCondLst>
-                      <p:childTnLst>
-                        <p:par>
-                          <p:cTn id="4" fill="hold">
-                            <p:stCondLst>
-                              <p:cond delay="0"/>
-                            </p:stCondLst>
-                            <p:childTnLst>
-                              <p:par>
-                                <p:cTn id="5" presetID="1" presetClass="entr" presetSubtype="0" fill="hold" nodeType="clickEffect">
-                                  <p:stCondLst>
-                                    <p:cond delay="0"/>
-                                  </p:stCondLst>
-                                  <p:childTnLst>
-                                    <p:set>
-                                      <p:cBhvr>
-                                        <p:cTn id="6" dur="1" fill="hold">
-                                          <p:stCondLst>
-                                            <p:cond delay="0"/>
-                                          </p:stCondLst>
-                                        </p:cTn>
-                                        <p:tgtEl>
-                                          <p:spTgt spid="3">
-                                            <p:txEl>
-                                              <p:pRg st="3" end="3"/>
-                                            </p:txEl>
-                                          </p:spTgt>
-                                        </p:tgtEl>
-                                        <p:attrNameLst>
-                                          <p:attrName>style.visibility</p:attrName>
-                                        </p:attrNameLst>
-                                      </p:cBhvr>
-                                      <p:to>
-                                        <p:strVal val="visible"/>
-                                      </p:to>
-                                    </p:set>
-                                  </p:childTnLst>
-                                </p:cTn>
-                              </p:par>
-                              <p:par>
-                                <p:cTn id="7" presetID="1" presetClass="entr" presetSubtype="0" fill="hold" nodeType="withEffect">
-                                  <p:stCondLst>
-                                    <p:cond delay="0"/>
-                                  </p:stCondLst>
-                                  <p:childTnLst>
-                                    <p:set>
-                                      <p:cBhvr>
-                                        <p:cTn id="8" dur="1" fill="hold">
-                                          <p:stCondLst>
-                                            <p:cond delay="0"/>
-                                          </p:stCondLst>
-                                        </p:cTn>
-                                        <p:tgtEl>
-                                          <p:spTgt spid="3">
-                                            <p:txEl>
-                                              <p:pRg st="4" end="4"/>
-                                            </p:txEl>
-                                          </p:spTgt>
-                                        </p:tgtEl>
-                                        <p:attrNameLst>
-                                          <p:attrName>style.visibility</p:attrName>
-                                        </p:attrNameLst>
-                                      </p:cBhvr>
-                                      <p:to>
-                                        <p:strVal val="visible"/>
-                                      </p:to>
-                                    </p:set>
-                                  </p:childTnLst>
-                                </p:cTn>
-                              </p:par>
-                              <p:par>
-                                <p:cTn id="9" presetID="1" presetClass="entr" presetSubtype="0" fill="hold" nodeType="withEffect">
-                                  <p:stCondLst>
-                                    <p:cond delay="0"/>
-                                  </p:stCondLst>
-                                  <p:childTnLst>
-                                    <p:set>
-                                      <p:cBhvr>
-                                        <p:cTn id="10" dur="1" fill="hold">
-                                          <p:stCondLst>
-                                            <p:cond delay="0"/>
-                                          </p:stCondLst>
-                                        </p:cTn>
-                                        <p:tgtEl>
-                                          <p:spTgt spid="3">
-                                            <p:txEl>
-                                              <p:pRg st="5" end="5"/>
-                                            </p:txEl>
-                                          </p:spTgt>
-                                        </p:tgtEl>
-                                        <p:attrNameLst>
-                                          <p:attrName>style.visibility</p:attrName>
-                                        </p:attrNameLst>
-                                      </p:cBhvr>
-                                      <p:to>
-                                        <p:strVal val="visible"/>
-                                      </p:to>
-                                    </p:set>
-                                  </p:childTnLst>
-                                </p:cTn>
-                              </p:par>
-                            </p:childTnLst>
-                          </p:cTn>
-                        </p:par>
-                      </p:childTnLst>
-                    </p:cTn>
-                  </p:par>
-                </p:childTnLst>
-              </p:cTn>
-              <p:prevCondLst>
-                <p:cond evt="onPrev" delay="0">
-                  <p:tgtEl>
-                    <p:sldTgt/>
-                  </p:tgtEl>
-                </p:cond>
-              </p:prevCondLst>
-              <p:nextCondLst>
-                <p:cond evt="onNext" delay="0">
-                  <p:tgtEl>
-                    <p:sldTgt/>
-                  </p:tgtEl>
-                </p:cond>
-              </p:nextCondLst>
-            </p:seq>
-          </p:childTnLst>
-        </p:cTn>
-      </p:par>
-    </p:tnLst>
-  </p:timing>
-</p:sld>
-</file>
-
-<file path=ppt/slides/slide9.xml><?xml version="1.0" encoding="utf-8"?>
-<p:sld xmlns:a="http://schemas.openxmlformats.org/drawingml/2006/main" xmlns:r="http://schemas.openxmlformats.org/officeDocument/2006/relationships" xmlns:p="http://schemas.openxmlformats.org/presentationml/2006/main">
-  <p:cSld>
-    <p:spTree>
-      <p:nvGrpSpPr>
-        <p:cNvPr id="1" name=""/>
-        <p:cNvGrpSpPr/>
-        <p:nvPr/>
-      </p:nvGrpSpPr>
-      <p:grpSpPr>
-        <a:xfrm>
-          <a:off x="0" y="0"/>
-          <a:ext cx="0" cy="0"/>
-          <a:chOff x="0" y="0"/>
-          <a:chExt cx="0" cy="0"/>
-        </a:xfrm>
-      </p:grpSpPr>
-      <p:sp>
-        <p:nvSpPr>
-          <p:cNvPr id="2" name="Title 1">
-            <a:extLst>
-              <a:ext uri="{FF2B5EF4-FFF2-40B4-BE49-F238E27FC236}">
-                <a16:creationId xmlns:a16="http://schemas.microsoft.com/office/drawing/2014/main" id="{F2153DD3-C27C-457D-ADDD-066D01CB95CA}"/>
-              </a:ext>
-            </a:extLst>
-          </p:cNvPr>
-          <p:cNvSpPr>
-            <a:spLocks noGrp="1"/>
-          </p:cNvSpPr>
-          <p:nvPr>
-            <p:ph type="title"/>
-          </p:nvPr>
-        </p:nvSpPr>
-        <p:spPr>
-          <a:xfrm>
-            <a:off x="1096766" y="244867"/>
-            <a:ext cx="9875520" cy="1356360"/>
-          </a:xfrm>
-        </p:spPr>
-        <p:txBody>
-          <a:bodyPr/>
-          <a:lstStyle/>
-          <a:p>
-            <a:r>
-              <a:rPr lang="en-US" dirty="0">
-                <a:latin typeface="Rockwell" panose="02060603020205020403" pitchFamily="18" charset="0"/>
-              </a:rPr>
-              <a:t>Discussion</a:t>
-            </a:r>
-          </a:p>
-        </p:txBody>
-      </p:sp>
-      <p:pic>
-        <p:nvPicPr>
-          <p:cNvPr id="5" name="Graphic 4" descr="Teacher">
-            <a:extLst>
-              <a:ext uri="{FF2B5EF4-FFF2-40B4-BE49-F238E27FC236}">
-                <a16:creationId xmlns:a16="http://schemas.microsoft.com/office/drawing/2014/main" id="{79AA3F49-E7A4-4660-84DA-0DC43809C2DB}"/>
-              </a:ext>
-            </a:extLst>
-          </p:cNvPr>
-          <p:cNvPicPr>
-            <a:picLocks noChangeAspect="1"/>
-          </p:cNvPicPr>
-          <p:nvPr/>
-        </p:nvPicPr>
-        <p:blipFill>
-          <a:blip r:embed="rId2">
-            <a:extLst>
-              <a:ext uri="{96DAC541-7B7A-43D3-8B79-37D633B846F1}">
-                <asvg:svgBlip xmlns:asvg="http://schemas.microsoft.com/office/drawing/2016/SVG/main" r:embed="rId3"/>
-              </a:ext>
-            </a:extLst>
-          </a:blip>
-          <a:stretch>
-            <a:fillRect/>
-          </a:stretch>
-        </p:blipFill>
-        <p:spPr>
-          <a:xfrm>
-            <a:off x="4280263" y="465847"/>
-            <a:ext cx="914400" cy="914400"/>
-          </a:xfrm>
-          <a:prstGeom prst="rect">
-            <a:avLst/>
-          </a:prstGeom>
-        </p:spPr>
-      </p:pic>
-      <p:sp>
-        <p:nvSpPr>
-          <p:cNvPr id="3" name="Content Placeholder 2">
-            <a:extLst>
-              <a:ext uri="{FF2B5EF4-FFF2-40B4-BE49-F238E27FC236}">
-                <a16:creationId xmlns:a16="http://schemas.microsoft.com/office/drawing/2014/main" id="{C212DA85-9288-495A-A4BE-E87C9AC81A60}"/>
-              </a:ext>
-            </a:extLst>
-          </p:cNvPr>
-          <p:cNvSpPr>
-            <a:spLocks noGrp="1"/>
-          </p:cNvSpPr>
-          <p:nvPr>
-            <p:ph idx="1"/>
-          </p:nvPr>
-        </p:nvSpPr>
-        <p:spPr/>
-        <p:txBody>
-          <a:bodyPr>
-            <a:normAutofit/>
-          </a:bodyPr>
-          <a:lstStyle/>
-          <a:p>
-            <a:pPr marL="45720" indent="0">
-              <a:buNone/>
-            </a:pPr>
-            <a:r>
-              <a:rPr lang="en-AU" sz="2400" b="1" dirty="0"/>
-              <a:t>Question:</a:t>
-            </a:r>
-          </a:p>
-          <a:p>
-            <a:pPr marL="45720" indent="0">
-              <a:buNone/>
-            </a:pPr>
-            <a:r>
-              <a:rPr lang="en-AU" sz="2400" dirty="0"/>
-              <a:t>What are traits you believe make good team members?</a:t>
-            </a:r>
-          </a:p>
-          <a:p>
-            <a:pPr marL="45720" indent="0">
-              <a:buNone/>
-            </a:pPr>
-            <a:r>
-              <a:rPr lang="en-AU" sz="2400" dirty="0"/>
-              <a:t>How do you decide who is on your team?</a:t>
-            </a:r>
-          </a:p>
-          <a:p>
-            <a:pPr marL="45720" indent="0">
-              <a:buNone/>
-            </a:pPr>
-            <a:endParaRPr lang="en-AU" sz="2400" dirty="0"/>
-          </a:p>
-          <a:p>
-            <a:pPr marL="45720" indent="0">
-              <a:buNone/>
-            </a:pPr>
-            <a:r>
-              <a:rPr lang="en-AU" sz="2400" b="1" dirty="0"/>
-              <a:t>My opinion:</a:t>
-            </a:r>
-          </a:p>
-          <a:p>
-            <a:pPr marL="45720" indent="0">
-              <a:buNone/>
-            </a:pPr>
-            <a:r>
-              <a:rPr lang="en-AU" sz="2400" dirty="0"/>
-              <a:t>Friendly, empathetic, punctual and willing to learn.</a:t>
-            </a:r>
-          </a:p>
-          <a:p>
-            <a:pPr marL="45720" indent="0">
-              <a:buNone/>
-            </a:pPr>
-            <a:r>
-              <a:rPr lang="en-AU" sz="2400" dirty="0"/>
-              <a:t>Skill is a secondary trait for me. </a:t>
-            </a:r>
-          </a:p>
-        </p:txBody>
-      </p:sp>
-    </p:spTree>
-    <p:extLst>
-      <p:ext uri="{BB962C8B-B14F-4D97-AF65-F5344CB8AC3E}">
-        <p14:creationId xmlns:p14="http://schemas.microsoft.com/office/powerpoint/2010/main" val="1993043609"/>
-      </p:ext>
-    </p:extLst>
-  </p:cSld>
-  <p:clrMapOvr>
-    <a:masterClrMapping/>
-  </p:clrMapOvr>
-  <p:timing>
-    <p:tnLst>
-      <p:par>
-        <p:cTn id="1" dur="indefinite" restart="never" nodeType="tmRoot">
-          <p:childTnLst>
-            <p:seq concurrent="1" nextAc="seek">
-              <p:cTn id="2" dur="indefinite" nodeType="mainSeq">
-                <p:childTnLst>
-                  <p:par>
-                    <p:cTn id="3" fill="hold">
-                      <p:stCondLst>
-                        <p:cond delay="indefinite"/>
-                      </p:stCondLst>
-                      <p:childTnLst>
-                        <p:par>
-                          <p:cTn id="4" fill="hold">
-                            <p:stCondLst>
-                              <p:cond delay="0"/>
-                            </p:stCondLst>
-                            <p:childTnLst>
-                              <p:par>
-                                <p:cTn id="5" presetID="1" presetClass="entr" presetSubtype="0" fill="hold" nodeType="clickEffect">
-                                  <p:stCondLst>
-                                    <p:cond delay="0"/>
-                                  </p:stCondLst>
-                                  <p:childTnLst>
-                                    <p:set>
-                                      <p:cBhvr>
-                                        <p:cTn id="6" dur="1" fill="hold">
-                                          <p:stCondLst>
-                                            <p:cond delay="0"/>
-                                          </p:stCondLst>
-                                        </p:cTn>
-                                        <p:tgtEl>
-                                          <p:spTgt spid="3">
-                                            <p:txEl>
-                                              <p:pRg st="4" end="4"/>
-                                            </p:txEl>
-                                          </p:spTgt>
-                                        </p:tgtEl>
-                                        <p:attrNameLst>
-                                          <p:attrName>style.visibility</p:attrName>
-                                        </p:attrNameLst>
-                                      </p:cBhvr>
-                                      <p:to>
-                                        <p:strVal val="visible"/>
-                                      </p:to>
-                                    </p:set>
-                                  </p:childTnLst>
-                                </p:cTn>
-                              </p:par>
-                              <p:par>
-                                <p:cTn id="7" presetID="1" presetClass="entr" presetSubtype="0" fill="hold" nodeType="withEffect">
-                                  <p:stCondLst>
-                                    <p:cond delay="0"/>
-                                  </p:stCondLst>
-                                  <p:childTnLst>
-                                    <p:set>
-                                      <p:cBhvr>
-                                        <p:cTn id="8" dur="1" fill="hold">
-                                          <p:stCondLst>
-                                            <p:cond delay="0"/>
-                                          </p:stCondLst>
-                                        </p:cTn>
-                                        <p:tgtEl>
-                                          <p:spTgt spid="3">
-                                            <p:txEl>
-                                              <p:pRg st="5" end="5"/>
-                                            </p:txEl>
-                                          </p:spTgt>
-                                        </p:tgtEl>
-                                        <p:attrNameLst>
-                                          <p:attrName>style.visibility</p:attrName>
-                                        </p:attrNameLst>
-                                      </p:cBhvr>
-                                      <p:to>
-                                        <p:strVal val="visible"/>
-                                      </p:to>
-                                    </p:set>
-                                  </p:childTnLst>
-                                </p:cTn>
-                              </p:par>
-                              <p:par>
-                                <p:cTn id="9" presetID="1" presetClass="entr" presetSubtype="0" fill="hold" nodeType="withEffect">
-                                  <p:stCondLst>
-                                    <p:cond delay="0"/>
-                                  </p:stCondLst>
-                                  <p:childTnLst>
-                                    <p:set>
-                                      <p:cBhvr>
-                                        <p:cTn id="10" dur="1" fill="hold">
                                           <p:stCondLst>
                                             <p:cond delay="0"/>
                                           </p:stCondLst>
@@ -8104,11 +8366,12 @@
 </file>
 
 <file path=customXml/item1.xml><?xml version="1.0" encoding="utf-8"?>
-<p:properties xmlns:p="http://schemas.microsoft.com/office/2006/metadata/properties" xmlns:xsi="http://www.w3.org/2001/XMLSchema-instance" xmlns:pc="http://schemas.microsoft.com/office/infopath/2007/PartnerControls">
-  <documentManagement>
-    <MediaServiceKeyPoints xmlns="71af3243-3dd4-4a8d-8c0d-dd76da1f02a5" xsi:nil="true"/>
-  </documentManagement>
-</p:properties>
+<?mso-contentType ?>
+<FormTemplates xmlns="http://schemas.microsoft.com/sharepoint/v3/contenttype/forms">
+  <Display>DocumentLibraryForm</Display>
+  <Edit>DocumentLibraryForm</Edit>
+  <New>DocumentLibraryForm</New>
+</FormTemplates>
 </file>
 
 <file path=customXml/item2.xml><?xml version="1.0" encoding="utf-8"?>
@@ -8323,20 +8586,17 @@
 </file>
 
 <file path=customXml/item3.xml><?xml version="1.0" encoding="utf-8"?>
-<?mso-contentType ?>
-<FormTemplates xmlns="http://schemas.microsoft.com/sharepoint/v3/contenttype/forms">
-  <Display>DocumentLibraryForm</Display>
-  <Edit>DocumentLibraryForm</Edit>
-  <New>DocumentLibraryForm</New>
-</FormTemplates>
+<p:properties xmlns:p="http://schemas.microsoft.com/office/2006/metadata/properties" xmlns:xsi="http://www.w3.org/2001/XMLSchema-instance" xmlns:pc="http://schemas.microsoft.com/office/infopath/2007/PartnerControls">
+  <documentManagement>
+    <MediaServiceKeyPoints xmlns="71af3243-3dd4-4a8d-8c0d-dd76da1f02a5" xsi:nil="true"/>
+  </documentManagement>
+</p:properties>
 </file>
 
 <file path=customXml/itemProps1.xml><?xml version="1.0" encoding="utf-8"?>
-<ds:datastoreItem xmlns:ds="http://schemas.openxmlformats.org/officeDocument/2006/customXml" ds:itemID="{3D6CA70E-ED75-4FF0-A862-8EF12B737755}">
+<ds:datastoreItem xmlns:ds="http://schemas.openxmlformats.org/officeDocument/2006/customXml" ds:itemID="{ABF1ABED-93B7-45AC-A513-2CB1FF159AFF}">
   <ds:schemaRefs>
-    <ds:schemaRef ds:uri="http://schemas.microsoft.com/office/2006/metadata/properties"/>
-    <ds:schemaRef ds:uri="http://schemas.microsoft.com/office/infopath/2007/PartnerControls"/>
-    <ds:schemaRef ds:uri="71af3243-3dd4-4a8d-8c0d-dd76da1f02a5"/>
+    <ds:schemaRef ds:uri="http://schemas.microsoft.com/sharepoint/v3/contenttype/forms"/>
   </ds:schemaRefs>
 </ds:datastoreItem>
 </file>
@@ -8361,9 +8621,11 @@
 </file>
 
 <file path=customXml/itemProps3.xml><?xml version="1.0" encoding="utf-8"?>
-<ds:datastoreItem xmlns:ds="http://schemas.openxmlformats.org/officeDocument/2006/customXml" ds:itemID="{ABF1ABED-93B7-45AC-A513-2CB1FF159AFF}">
+<ds:datastoreItem xmlns:ds="http://schemas.openxmlformats.org/officeDocument/2006/customXml" ds:itemID="{3D6CA70E-ED75-4FF0-A862-8EF12B737755}">
   <ds:schemaRefs>
-    <ds:schemaRef ds:uri="http://schemas.microsoft.com/sharepoint/v3/contenttype/forms"/>
+    <ds:schemaRef ds:uri="http://schemas.microsoft.com/office/2006/metadata/properties"/>
+    <ds:schemaRef ds:uri="http://schemas.microsoft.com/office/infopath/2007/PartnerControls"/>
+    <ds:schemaRef ds:uri="71af3243-3dd4-4a8d-8c0d-dd76da1f02a5"/>
   </ds:schemaRefs>
 </ds:datastoreItem>
 </file>
</xml_diff>